<commit_message>
Data 607 Presentation slides
</commit_message>
<xml_diff>
--- a/Data 607 - Presentation.pptx
+++ b/Data 607 - Presentation.pptx
@@ -122,6 +122,11 @@
       </a:defRPr>
     </a:lvl9pPr>
   </p:defaultTextStyle>
+  <p:extLst>
+    <p:ext uri="{EFAFB233-063F-42B5-8137-9DF3F51BA10A}">
+      <p15:sldGuideLst xmlns:p15="http://schemas.microsoft.com/office/powerpoint/2012/main"/>
+    </p:ext>
+  </p:extLst>
 </p:presentation>
 </file>
 
@@ -1047,7 +1052,7 @@
           <a:p>
             <a:fld id="{72345051-2045-45DA-935E-2E3CA1A69ADC}" type="datetimeFigureOut">
               <a:rPr lang="en-US" smtClean="0"/>
-              <a:t>2/21/20</a:t>
+              <a:t>3/11/20</a:t>
             </a:fld>
             <a:endParaRPr lang="en-US"/>
           </a:p>
@@ -1245,7 +1250,7 @@
           <a:p>
             <a:fld id="{72345051-2045-45DA-935E-2E3CA1A69ADC}" type="datetimeFigureOut">
               <a:rPr lang="en-US" smtClean="0"/>
-              <a:t>2/21/20</a:t>
+              <a:t>3/11/20</a:t>
             </a:fld>
             <a:endParaRPr lang="en-US"/>
           </a:p>
@@ -1453,7 +1458,7 @@
           <a:p>
             <a:fld id="{72345051-2045-45DA-935E-2E3CA1A69ADC}" type="datetimeFigureOut">
               <a:rPr lang="en-US" smtClean="0"/>
-              <a:t>2/21/20</a:t>
+              <a:t>3/11/20</a:t>
             </a:fld>
             <a:endParaRPr lang="en-US"/>
           </a:p>
@@ -1676,7 +1681,7 @@
           <a:p>
             <a:fld id="{72345051-2045-45DA-935E-2E3CA1A69ADC}" type="datetimeFigureOut">
               <a:rPr lang="en-US" smtClean="0"/>
-              <a:t>2/21/20</a:t>
+              <a:t>3/11/20</a:t>
             </a:fld>
             <a:endParaRPr lang="en-US"/>
           </a:p>
@@ -2587,7 +2592,7 @@
           <a:p>
             <a:fld id="{72345051-2045-45DA-935E-2E3CA1A69ADC}" type="datetimeFigureOut">
               <a:rPr lang="en-US" smtClean="0"/>
-              <a:t>2/21/20</a:t>
+              <a:t>3/11/20</a:t>
             </a:fld>
             <a:endParaRPr lang="en-US"/>
           </a:p>
@@ -3191,7 +3196,7 @@
           <a:p>
             <a:fld id="{72345051-2045-45DA-935E-2E3CA1A69ADC}" type="datetimeFigureOut">
               <a:rPr lang="en-US" smtClean="0"/>
-              <a:t>2/21/20</a:t>
+              <a:t>3/11/20</a:t>
             </a:fld>
             <a:endParaRPr lang="en-US"/>
           </a:p>
@@ -4240,7 +4245,7 @@
           <a:p>
             <a:fld id="{72345051-2045-45DA-935E-2E3CA1A69ADC}" type="datetimeFigureOut">
               <a:rPr lang="en-US" smtClean="0"/>
-              <a:t>2/21/20</a:t>
+              <a:t>3/11/20</a:t>
             </a:fld>
             <a:endParaRPr lang="en-US"/>
           </a:p>
@@ -5024,7 +5029,7 @@
           <a:p>
             <a:fld id="{72345051-2045-45DA-935E-2E3CA1A69ADC}" type="datetimeFigureOut">
               <a:rPr lang="en-US" smtClean="0"/>
-              <a:t>2/21/20</a:t>
+              <a:t>3/11/20</a:t>
             </a:fld>
             <a:endParaRPr lang="en-US"/>
           </a:p>
@@ -5473,7 +5478,7 @@
           <a:p>
             <a:fld id="{72345051-2045-45DA-935E-2E3CA1A69ADC}" type="datetimeFigureOut">
               <a:rPr lang="en-US" smtClean="0"/>
-              <a:t>2/21/20</a:t>
+              <a:t>3/11/20</a:t>
             </a:fld>
             <a:endParaRPr lang="en-US"/>
           </a:p>
@@ -5790,7 +5795,7 @@
           <a:p>
             <a:fld id="{72345051-2045-45DA-935E-2E3CA1A69ADC}" type="datetimeFigureOut">
               <a:rPr lang="en-US" smtClean="0"/>
-              <a:t>2/21/20</a:t>
+              <a:t>3/11/20</a:t>
             </a:fld>
             <a:endParaRPr lang="en-US"/>
           </a:p>
@@ -6418,7 +6423,7 @@
           <a:p>
             <a:fld id="{72345051-2045-45DA-935E-2E3CA1A69ADC}" type="datetimeFigureOut">
               <a:rPr lang="en-US" smtClean="0"/>
-              <a:t>2/21/20</a:t>
+              <a:t>3/11/20</a:t>
             </a:fld>
             <a:endParaRPr lang="en-US"/>
           </a:p>
@@ -6993,7 +6998,7 @@
           <a:p>
             <a:fld id="{72345051-2045-45DA-935E-2E3CA1A69ADC}" type="datetimeFigureOut">
               <a:rPr lang="en-US" smtClean="0"/>
-              <a:t>2/21/20</a:t>
+              <a:t>3/11/20</a:t>
             </a:fld>
             <a:endParaRPr lang="en-US"/>
           </a:p>
@@ -8985,6 +8990,33 @@
           <a:p>
             <a:endParaRPr lang="en-US" sz="2000" u="sng" dirty="0">
               <a:solidFill>
+                <a:srgbClr val="002060"/>
+              </a:solidFill>
+              <a:latin typeface="Arial" panose="020B0604020202020204" pitchFamily="34" charset="0"/>
+              <a:cs typeface="Arial" panose="020B0604020202020204" pitchFamily="34" charset="0"/>
+            </a:endParaRPr>
+          </a:p>
+          <a:p>
+            <a:endParaRPr lang="en-US" sz="2000" u="sng" dirty="0">
+              <a:solidFill>
+                <a:srgbClr val="002060"/>
+              </a:solidFill>
+              <a:latin typeface="Arial" panose="020B0604020202020204" pitchFamily="34" charset="0"/>
+              <a:cs typeface="Arial" panose="020B0604020202020204" pitchFamily="34" charset="0"/>
+            </a:endParaRPr>
+          </a:p>
+          <a:p>
+            <a:endParaRPr lang="en-US" sz="2000" u="sng" dirty="0">
+              <a:solidFill>
+                <a:srgbClr val="002060"/>
+              </a:solidFill>
+              <a:latin typeface="Arial" panose="020B0604020202020204" pitchFamily="34" charset="0"/>
+              <a:cs typeface="Arial" panose="020B0604020202020204" pitchFamily="34" charset="0"/>
+            </a:endParaRPr>
+          </a:p>
+          <a:p>
+            <a:endParaRPr lang="en-US" sz="2000" u="sng" dirty="0">
+              <a:solidFill>
                 <a:schemeClr val="accent1"/>
               </a:solidFill>
               <a:latin typeface="Arial" panose="020B0604020202020204" pitchFamily="34" charset="0"/>
@@ -9106,10 +9138,10 @@
       </p:sp>
       <p:pic>
         <p:nvPicPr>
-          <p:cNvPr id="5" name="Picture 4" descr="A screenshot of a cell phone&#10;&#10;Description automatically generated">
+          <p:cNvPr id="6" name="Picture 5" descr="A screenshot of a cell phone&#10;&#10;Description automatically generated">
             <a:extLst>
               <a:ext uri="{FF2B5EF4-FFF2-40B4-BE49-F238E27FC236}">
-                <a16:creationId xmlns:a16="http://schemas.microsoft.com/office/drawing/2014/main" id="{F5B5D89F-CCE8-F443-81D9-63513F29ED6F}"/>
+                <a16:creationId xmlns:a16="http://schemas.microsoft.com/office/drawing/2014/main" id="{95A6D505-6D82-1241-95E3-1B87FF542EF6}"/>
               </a:ext>
             </a:extLst>
           </p:cNvPr>
@@ -9126,8 +9158,8 @@
         </p:blipFill>
         <p:spPr>
           <a:xfrm>
-            <a:off x="1660633" y="1996965"/>
-            <a:ext cx="5454869" cy="4139543"/>
+            <a:off x="1582439" y="1555535"/>
+            <a:ext cx="5091630" cy="4698120"/>
           </a:xfrm>
           <a:prstGeom prst="rect">
             <a:avLst/>
@@ -9136,10 +9168,10 @@
       </p:pic>
       <p:pic>
         <p:nvPicPr>
-          <p:cNvPr id="8" name="Picture 7">
+          <p:cNvPr id="9" name="Picture 8" descr="A screenshot of a cell phone&#10;&#10;Description automatically generated">
             <a:extLst>
               <a:ext uri="{FF2B5EF4-FFF2-40B4-BE49-F238E27FC236}">
-                <a16:creationId xmlns:a16="http://schemas.microsoft.com/office/drawing/2014/main" id="{6ACCEE65-B1E0-B843-A583-7E91E31EBB1E}"/>
+                <a16:creationId xmlns:a16="http://schemas.microsoft.com/office/drawing/2014/main" id="{D8520355-1C95-7E4C-9D95-B242C4E30C18}"/>
               </a:ext>
             </a:extLst>
           </p:cNvPr>
@@ -9156,8 +9188,8 @@
         </p:blipFill>
         <p:spPr>
           <a:xfrm>
-            <a:off x="7294180" y="1933905"/>
-            <a:ext cx="4550980" cy="4155894"/>
+            <a:off x="6778752" y="1198179"/>
+            <a:ext cx="4892729" cy="5129052"/>
           </a:xfrm>
           <a:prstGeom prst="rect">
             <a:avLst/>

</xml_diff>